<commit_message>
Minor modifications in the scripts. Added slides to the presentations.
</commit_message>
<xml_diff>
--- a/ml-subjects/Unsupervised ML.pptx
+++ b/ml-subjects/Unsupervised ML.pptx
@@ -8,7 +8,7 @@
     <p:notesMasterId r:id="rId9"/>
   </p:notesMasterIdLst>
   <p:sldIdLst>
-    <p:sldId id="256" r:id="rId2"/>
+    <p:sldId id="264" r:id="rId2"/>
     <p:sldId id="257" r:id="rId3"/>
     <p:sldId id="258" r:id="rId4"/>
     <p:sldId id="260" r:id="rId5"/>
@@ -229,7 +229,7 @@
             <a:fld id="{D9C8E9B5-BDE3-4B8B-9CB9-F9711AFA1353}" type="datetimeFigureOut">
               <a:rPr lang="en-US" smtClean="0"/>
               <a:pPr/>
-              <a:t>11/19/2019</a:t>
+              <a:t>11/28/2019</a:t>
             </a:fld>
             <a:endParaRPr lang="en-US"/>
           </a:p>
@@ -694,7 +694,7 @@
             <a:fld id="{1D8BD707-D9CF-40AE-B4C6-C98DA3205C09}" type="datetimeFigureOut">
               <a:rPr lang="en-US" smtClean="0"/>
               <a:pPr/>
-              <a:t>11/19/2019</a:t>
+              <a:t>11/28/2019</a:t>
             </a:fld>
             <a:endParaRPr lang="en-US"/>
           </a:p>
@@ -936,7 +936,7 @@
             <a:fld id="{1D8BD707-D9CF-40AE-B4C6-C98DA3205C09}" type="datetimeFigureOut">
               <a:rPr lang="en-US" smtClean="0"/>
               <a:pPr/>
-              <a:t>11/19/2019</a:t>
+              <a:t>11/28/2019</a:t>
             </a:fld>
             <a:endParaRPr lang="en-US"/>
           </a:p>
@@ -1121,7 +1121,7 @@
             <a:fld id="{1D8BD707-D9CF-40AE-B4C6-C98DA3205C09}" type="datetimeFigureOut">
               <a:rPr lang="en-US" smtClean="0"/>
               <a:pPr/>
-              <a:t>11/19/2019</a:t>
+              <a:t>11/28/2019</a:t>
             </a:fld>
             <a:endParaRPr lang="en-US"/>
           </a:p>
@@ -1343,7 +1343,7 @@
             <a:fld id="{1D8BD707-D9CF-40AE-B4C6-C98DA3205C09}" type="datetimeFigureOut">
               <a:rPr lang="en-US" smtClean="0"/>
               <a:pPr/>
-              <a:t>11/19/2019</a:t>
+              <a:t>11/28/2019</a:t>
             </a:fld>
             <a:endParaRPr lang="en-US"/>
           </a:p>
@@ -1661,7 +1661,7 @@
             <a:fld id="{1D8BD707-D9CF-40AE-B4C6-C98DA3205C09}" type="datetimeFigureOut">
               <a:rPr lang="en-US" smtClean="0"/>
               <a:pPr/>
-              <a:t>11/19/2019</a:t>
+              <a:t>11/28/2019</a:t>
             </a:fld>
             <a:endParaRPr lang="en-US"/>
           </a:p>
@@ -1954,7 +1954,7 @@
             <a:fld id="{1D8BD707-D9CF-40AE-B4C6-C98DA3205C09}" type="datetimeFigureOut">
               <a:rPr lang="en-US" smtClean="0"/>
               <a:pPr/>
-              <a:t>11/19/2019</a:t>
+              <a:t>11/28/2019</a:t>
             </a:fld>
             <a:endParaRPr lang="en-US"/>
           </a:p>
@@ -2381,7 +2381,7 @@
             <a:fld id="{1D8BD707-D9CF-40AE-B4C6-C98DA3205C09}" type="datetimeFigureOut">
               <a:rPr lang="en-US" smtClean="0"/>
               <a:pPr/>
-              <a:t>11/19/2019</a:t>
+              <a:t>11/28/2019</a:t>
             </a:fld>
             <a:endParaRPr lang="en-US"/>
           </a:p>
@@ -2504,7 +2504,7 @@
             <a:fld id="{1D8BD707-D9CF-40AE-B4C6-C98DA3205C09}" type="datetimeFigureOut">
               <a:rPr lang="en-US" smtClean="0"/>
               <a:pPr/>
-              <a:t>11/19/2019</a:t>
+              <a:t>11/28/2019</a:t>
             </a:fld>
             <a:endParaRPr lang="en-US"/>
           </a:p>
@@ -2604,7 +2604,7 @@
             <a:fld id="{1D8BD707-D9CF-40AE-B4C6-C98DA3205C09}" type="datetimeFigureOut">
               <a:rPr lang="en-US" smtClean="0"/>
               <a:pPr/>
-              <a:t>11/19/2019</a:t>
+              <a:t>11/28/2019</a:t>
             </a:fld>
             <a:endParaRPr lang="en-US"/>
           </a:p>
@@ -2886,7 +2886,7 @@
             <a:fld id="{1D8BD707-D9CF-40AE-B4C6-C98DA3205C09}" type="datetimeFigureOut">
               <a:rPr lang="en-US" smtClean="0"/>
               <a:pPr/>
-              <a:t>11/19/2019</a:t>
+              <a:t>11/28/2019</a:t>
             </a:fld>
             <a:endParaRPr lang="en-US"/>
           </a:p>
@@ -3144,7 +3144,7 @@
             <a:fld id="{1D8BD707-D9CF-40AE-B4C6-C98DA3205C09}" type="datetimeFigureOut">
               <a:rPr lang="en-US" smtClean="0"/>
               <a:pPr/>
-              <a:t>11/19/2019</a:t>
+              <a:t>11/28/2019</a:t>
             </a:fld>
             <a:endParaRPr lang="en-US"/>
           </a:p>
@@ -3357,7 +3357,7 @@
             <a:fld id="{1D8BD707-D9CF-40AE-B4C6-C98DA3205C09}" type="datetimeFigureOut">
               <a:rPr lang="en-US" smtClean="0"/>
               <a:pPr/>
-              <a:t>11/19/2019</a:t>
+              <a:t>11/28/2019</a:t>
             </a:fld>
             <a:endParaRPr lang="en-US"/>
           </a:p>
@@ -3757,7 +3757,7 @@
           <a:p>
             <a:r>
               <a:rPr lang="en-US" dirty="0" smtClean="0"/>
-              <a:t>Unsupervised ML</a:t>
+              <a:t>Unsupervised Machine Learning</a:t>
             </a:r>
             <a:endParaRPr lang="en-US" dirty="0"/>
           </a:p>
@@ -3775,7 +3775,7 @@
         </p:nvSpPr>
         <p:spPr>
           <a:xfrm>
-            <a:off x="1371600" y="3429000"/>
+            <a:off x="1371600" y="3886200"/>
             <a:ext cx="6400800" cy="1752600"/>
           </a:xfrm>
         </p:spPr>
@@ -3792,11 +3792,7 @@
             </a:br>
             <a:r>
               <a:rPr lang="en-US" dirty="0" smtClean="0"/>
-              <a:t>INRA</a:t>
-            </a:r>
-            <a:r>
-              <a:rPr lang="en-US" dirty="0"/>
-              <a:t>, </a:t>
+              <a:t>INRA(E), </a:t>
             </a:r>
             <a:r>
               <a:rPr lang="en-US" dirty="0" err="1" smtClean="0"/>
@@ -3804,11 +3800,26 @@
             </a:r>
             <a:r>
               <a:rPr lang="en-US" dirty="0" smtClean="0"/>
-              <a:t> Paris-</a:t>
+              <a:t> </a:t>
+            </a:r>
+            <a:r>
+              <a:rPr lang="en-US" dirty="0" smtClean="0"/>
+              <a:t>Paris-</a:t>
             </a:r>
             <a:r>
               <a:rPr lang="en-US" dirty="0" err="1" smtClean="0"/>
               <a:t>Saclay</a:t>
+            </a:r>
+            <a:r>
+              <a:rPr lang="en-US" dirty="0" smtClean="0"/>
+              <a:t/>
+            </a:r>
+            <a:br>
+              <a:rPr lang="en-US" dirty="0" smtClean="0"/>
+            </a:br>
+            <a:r>
+              <a:rPr lang="en-US" dirty="0" smtClean="0"/>
+              <a:t>France</a:t>
             </a:r>
             <a:endParaRPr lang="en-US" dirty="0"/>
           </a:p>
@@ -3950,7 +3961,7 @@
     </p:spTree>
     <p:extLst>
       <p:ext uri="{BB962C8B-B14F-4D97-AF65-F5344CB8AC3E}">
-        <p14:creationId xmlns:p14="http://schemas.microsoft.com/office/powerpoint/2010/main" val="2386727562"/>
+        <p14:creationId xmlns:p14="http://schemas.microsoft.com/office/powerpoint/2010/main" val="286256738"/>
       </p:ext>
     </p:extLst>
   </p:cSld>

</xml_diff>